<commit_message>
corrected slides for C#
</commit_message>
<xml_diff>
--- a/05-Collections and Generics.pptx
+++ b/05-Collections and Generics.pptx
@@ -3123,7 +3123,7 @@
           <a:p>
             <a:fld id="{86D088FE-3E68-47FE-8BA4-634CD34BABBC}" type="datetimeFigureOut">
               <a:rPr lang="en-GB" smtClean="0"/>
-              <a:t>05/12/2025</a:t>
+              <a:t>10/12/2025</a:t>
             </a:fld>
             <a:endParaRPr lang="en-GB"/>
           </a:p>
@@ -3288,7 +3288,7 @@
           <a:p>
             <a:fld id="{1D6B66C6-1E92-0F4E-A300-9D4ED1F0C23F}" type="datetimeFigureOut">
               <a:rPr lang="en-GB" smtClean="0"/>
-              <a:t>05/12/2025</a:t>
+              <a:t>10/12/2025</a:t>
             </a:fld>
             <a:endParaRPr lang="en-GB"/>
           </a:p>
@@ -32198,13 +32198,31 @@
               <a:t>(</a:t>
             </a:r>
             <a:r>
+              <a:rPr lang="en-GB" dirty="0">
+                <a:solidFill>
+                  <a:srgbClr val="0000C8"/>
+                </a:solidFill>
+                <a:latin typeface="Lucida Console" pitchFamily="49" charset="0"/>
+              </a:rPr>
+              <a:t>int</a:t>
+            </a:r>
+            <a:r>
+              <a:rPr lang="en-GB" dirty="0">
+                <a:solidFill>
+                  <a:srgbClr val="000000"/>
+                </a:solidFill>
+                <a:latin typeface="Lucida Console" pitchFamily="49" charset="0"/>
+              </a:rPr>
+              <a:t> </a:t>
+            </a:r>
+            <a:r>
               <a:rPr lang="en-GB" dirty="0" err="1">
                 <a:solidFill>
-                  <a:srgbClr val="0000C8"/>
+                  <a:srgbClr val="000000"/>
                 </a:solidFill>
                 <a:latin typeface="Lucida Console" pitchFamily="49" charset="0"/>
               </a:rPr>
-              <a:t>int</a:t>
+              <a:t>i</a:t>
             </a:r>
             <a:r>
               <a:rPr lang="en-GB" dirty="0">
@@ -32213,7 +32231,7 @@
                 </a:solidFill>
                 <a:latin typeface="Lucida Console" pitchFamily="49" charset="0"/>
               </a:rPr>
-              <a:t> </a:t>
+              <a:t> = 0; </a:t>
             </a:r>
             <a:r>
               <a:rPr lang="en-GB" dirty="0" err="1">
@@ -32231,7 +32249,7 @@
                 </a:solidFill>
                 <a:latin typeface="Lucida Console" pitchFamily="49" charset="0"/>
               </a:rPr>
-              <a:t> = 0; </a:t>
+              <a:t> &lt; </a:t>
             </a:r>
             <a:r>
               <a:rPr lang="en-GB" dirty="0" err="1">
@@ -32240,7 +32258,7 @@
                 </a:solidFill>
                 <a:latin typeface="Lucida Console" pitchFamily="49" charset="0"/>
               </a:rPr>
-              <a:t>i</a:t>
+              <a:t>friends.Count</a:t>
             </a:r>
             <a:r>
               <a:rPr lang="en-GB" dirty="0">
@@ -32249,25 +32267,7 @@
                 </a:solidFill>
                 <a:latin typeface="Lucida Console" pitchFamily="49" charset="0"/>
               </a:rPr>
-              <a:t> &lt; </a:t>
-            </a:r>
-            <a:r>
-              <a:rPr lang="en-GB" dirty="0" err="1">
-                <a:solidFill>
-                  <a:srgbClr val="000000"/>
-                </a:solidFill>
-                <a:latin typeface="Lucida Console" pitchFamily="49" charset="0"/>
-              </a:rPr>
-              <a:t>friends.size</a:t>
-            </a:r>
-            <a:r>
-              <a:rPr lang="en-GB" dirty="0">
-                <a:solidFill>
-                  <a:srgbClr val="000000"/>
-                </a:solidFill>
-                <a:latin typeface="Lucida Console" pitchFamily="49" charset="0"/>
-              </a:rPr>
-              <a:t>(); </a:t>
+              <a:t>; </a:t>
             </a:r>
             <a:r>
               <a:rPr lang="en-GB" dirty="0" err="1">
@@ -32568,7 +32568,7 @@
         <p:spPr>
           <a:xfrm>
             <a:off x="7132204" y="4210846"/>
-            <a:ext cx="2159566" cy="338554"/>
+            <a:ext cx="1912703" cy="338554"/>
           </a:xfrm>
           <a:prstGeom prst="rect">
             <a:avLst/>
@@ -32618,7 +32618,7 @@
                 </a:solidFill>
                 <a:latin typeface="Lucida Console" pitchFamily="49" charset="0"/>
               </a:rPr>
-              <a:t>Note the size( )</a:t>
+              <a:t>Note the Count</a:t>
             </a:r>
           </a:p>
         </p:txBody>
@@ -36906,6 +36906,32 @@
 </file>
 
 <file path=customXml/item1.xml><?xml version="1.0" encoding="utf-8"?>
+<?mso-contentType ?>
+<FormTemplates xmlns="http://schemas.microsoft.com/sharepoint/v3/contenttype/forms">
+  <Display>DocumentLibraryForm</Display>
+  <Edit>DocumentLibraryForm</Edit>
+  <New>DocumentLibraryForm</New>
+</FormTemplates>
+</file>
+
+<file path=customXml/item2.xml><?xml version="1.0" encoding="utf-8"?>
+<p:properties xmlns:p="http://schemas.microsoft.com/office/2006/metadata/properties" xmlns:xsi="http://www.w3.org/2001/XMLSchema-instance" xmlns:pc="http://schemas.microsoft.com/office/infopath/2007/PartnerControls">
+  <documentManagement>
+    <SequenceNumber xmlns="6794D9DE-4FDF-4DC0-8B2C-5438320C69D5" xsi:nil="true"/>
+    <IsBuildFile xmlns="6794D9DE-4FDF-4DC0-8B2C-5438320C69D5" xsi:nil="true"/>
+    <BookTypeField0 xmlns="6794D9DE-4FDF-4DC0-8B2C-5438320C69D5">
+      <Terms xmlns="http://schemas.microsoft.com/office/infopath/2007/PartnerControls">
+        <TermInfo xmlns="http://schemas.microsoft.com/office/infopath/2007/PartnerControls">
+          <TermName xmlns="http://schemas.microsoft.com/office/infopath/2007/PartnerControls">IK</TermName>
+          <TermId xmlns="http://schemas.microsoft.com/office/infopath/2007/PartnerControls">5abe6401-e87a-4499-80b4-3d21a1a6ebd7</TermId>
+        </TermInfo>
+      </Terms>
+    </BookTypeField0>
+  </documentManagement>
+</p:properties>
+</file>
+
+<file path=customXml/item3.xml><?xml version="1.0" encoding="utf-8"?>
 <ct:contentTypeSchema xmlns:ct="http://schemas.microsoft.com/office/2006/metadata/contentType" xmlns:ma="http://schemas.microsoft.com/office/2006/metadata/properties/metaAttributes" ct:_="" ma:_="" ma:contentTypeName="Courseware" ma:contentTypeID="0x010100F0967B7CEE8D417F966757887D9466FB00B3EF5B1D149FDF49B1880C030D548140" ma:contentTypeVersion="0" ma:contentTypeDescription="Base content type which represents courseware documents" ma:contentTypeScope="" ma:versionID="ab0d7ca79e0ea5a537b031f986da336c">
   <xsd:schema xmlns:xsd="http://www.w3.org/2001/XMLSchema" xmlns:xs="http://www.w3.org/2001/XMLSchema" xmlns:p="http://schemas.microsoft.com/office/2006/metadata/properties" xmlns:ns2="6794D9DE-4FDF-4DC0-8B2C-5438320C69D5" targetNamespace="http://schemas.microsoft.com/office/2006/metadata/properties" ma:root="true" ma:fieldsID="7ff8e7c62cc10108c036e94c947d8fb9" ns2:_="">
     <xsd:import namespace="6794D9DE-4FDF-4DC0-8B2C-5438320C69D5"/>
@@ -37045,46 +37071,10 @@
 </ct:contentTypeSchema>
 </file>
 
-<file path=customXml/item2.xml><?xml version="1.0" encoding="utf-8"?>
-<p:properties xmlns:p="http://schemas.microsoft.com/office/2006/metadata/properties" xmlns:xsi="http://www.w3.org/2001/XMLSchema-instance" xmlns:pc="http://schemas.microsoft.com/office/infopath/2007/PartnerControls">
-  <documentManagement>
-    <SequenceNumber xmlns="6794D9DE-4FDF-4DC0-8B2C-5438320C69D5" xsi:nil="true"/>
-    <IsBuildFile xmlns="6794D9DE-4FDF-4DC0-8B2C-5438320C69D5" xsi:nil="true"/>
-    <BookTypeField0 xmlns="6794D9DE-4FDF-4DC0-8B2C-5438320C69D5">
-      <Terms xmlns="http://schemas.microsoft.com/office/infopath/2007/PartnerControls">
-        <TermInfo xmlns="http://schemas.microsoft.com/office/infopath/2007/PartnerControls">
-          <TermName xmlns="http://schemas.microsoft.com/office/infopath/2007/PartnerControls">IK</TermName>
-          <TermId xmlns="http://schemas.microsoft.com/office/infopath/2007/PartnerControls">5abe6401-e87a-4499-80b4-3d21a1a6ebd7</TermId>
-        </TermInfo>
-      </Terms>
-    </BookTypeField0>
-  </documentManagement>
-</p:properties>
-</file>
-
-<file path=customXml/item3.xml><?xml version="1.0" encoding="utf-8"?>
-<?mso-contentType ?>
-<FormTemplates xmlns="http://schemas.microsoft.com/sharepoint/v3/contenttype/forms">
-  <Display>DocumentLibraryForm</Display>
-  <Edit>DocumentLibraryForm</Edit>
-  <New>DocumentLibraryForm</New>
-</FormTemplates>
-</file>
-
 <file path=customXml/itemProps1.xml><?xml version="1.0" encoding="utf-8"?>
-<ds:datastoreItem xmlns:ds="http://schemas.openxmlformats.org/officeDocument/2006/customXml" ds:itemID="{2442E54C-49B3-4ECE-8754-14C669579CE3}">
+<ds:datastoreItem xmlns:ds="http://schemas.openxmlformats.org/officeDocument/2006/customXml" ds:itemID="{CF004844-36BD-44EF-80B0-D60F4D27F6BD}">
   <ds:schemaRefs>
-    <ds:schemaRef ds:uri="http://schemas.microsoft.com/office/2006/metadata/contentType"/>
-    <ds:schemaRef ds:uri="http://schemas.microsoft.com/office/2006/metadata/properties/metaAttributes"/>
-    <ds:schemaRef ds:uri="http://www.w3.org/2001/XMLSchema"/>
-    <ds:schemaRef ds:uri="http://schemas.microsoft.com/office/2006/metadata/properties"/>
-    <ds:schemaRef ds:uri="6794D9DE-4FDF-4DC0-8B2C-5438320C69D5"/>
-    <ds:schemaRef ds:uri="http://schemas.microsoft.com/office/2006/documentManagement/types"/>
-    <ds:schemaRef ds:uri="http://schemas.microsoft.com/office/infopath/2007/PartnerControls"/>
-    <ds:schemaRef ds:uri="http://schemas.openxmlformats.org/package/2006/metadata/core-properties"/>
-    <ds:schemaRef ds:uri="http://purl.org/dc/elements/1.1/"/>
-    <ds:schemaRef ds:uri="http://purl.org/dc/terms/"/>
-    <ds:schemaRef ds:uri="http://schemas.microsoft.com/internal/obd"/>
+    <ds:schemaRef ds:uri="http://schemas.microsoft.com/sharepoint/v3/contenttype/forms"/>
   </ds:schemaRefs>
 </ds:datastoreItem>
 </file>
@@ -37106,9 +37096,19 @@
 </file>
 
 <file path=customXml/itemProps3.xml><?xml version="1.0" encoding="utf-8"?>
-<ds:datastoreItem xmlns:ds="http://schemas.openxmlformats.org/officeDocument/2006/customXml" ds:itemID="{CF004844-36BD-44EF-80B0-D60F4D27F6BD}">
+<ds:datastoreItem xmlns:ds="http://schemas.openxmlformats.org/officeDocument/2006/customXml" ds:itemID="{2442E54C-49B3-4ECE-8754-14C669579CE3}">
   <ds:schemaRefs>
-    <ds:schemaRef ds:uri="http://schemas.microsoft.com/sharepoint/v3/contenttype/forms"/>
+    <ds:schemaRef ds:uri="http://schemas.microsoft.com/office/2006/metadata/contentType"/>
+    <ds:schemaRef ds:uri="http://schemas.microsoft.com/office/2006/metadata/properties/metaAttributes"/>
+    <ds:schemaRef ds:uri="http://www.w3.org/2001/XMLSchema"/>
+    <ds:schemaRef ds:uri="http://schemas.microsoft.com/office/2006/metadata/properties"/>
+    <ds:schemaRef ds:uri="6794D9DE-4FDF-4DC0-8B2C-5438320C69D5"/>
+    <ds:schemaRef ds:uri="http://schemas.microsoft.com/office/2006/documentManagement/types"/>
+    <ds:schemaRef ds:uri="http://schemas.microsoft.com/office/infopath/2007/PartnerControls"/>
+    <ds:schemaRef ds:uri="http://schemas.openxmlformats.org/package/2006/metadata/core-properties"/>
+    <ds:schemaRef ds:uri="http://purl.org/dc/elements/1.1/"/>
+    <ds:schemaRef ds:uri="http://purl.org/dc/terms/"/>
+    <ds:schemaRef ds:uri="http://schemas.microsoft.com/internal/obd"/>
   </ds:schemaRefs>
 </ds:datastoreItem>
 </file>
</xml_diff>